<commit_message>
updata data viz project
</commit_message>
<xml_diff>
--- a/Data Visualization/Project/Project V2/project presentation.pptx
+++ b/Data Visualization/Project/Project V2/project presentation.pptx
@@ -210,7 +210,7 @@
           <a:p>
             <a:fld id="{5499BAD2-05C4-4607-82FA-3A0F7D7BF3C0}" type="datetimeFigureOut">
               <a:rPr lang="zh-CN" altLang="en-US" smtClean="0"/>
-              <a:t>2020/11/24/Tue</a:t>
+              <a:t>2020/12/8/Tue</a:t>
             </a:fld>
             <a:endParaRPr lang="zh-CN" altLang="en-US"/>
           </a:p>
@@ -744,7 +744,7 @@
             <a:fld id="{1D8BD707-D9CF-40AE-B4C6-C98DA3205C09}" type="datetimeFigureOut">
               <a:rPr lang="en-US" smtClean="0"/>
               <a:pPr/>
-              <a:t>11/24/2020</a:t>
+              <a:t>12/8/2020</a:t>
             </a:fld>
             <a:endParaRPr lang="en-US"/>
           </a:p>
@@ -911,7 +911,7 @@
             <a:fld id="{1D8BD707-D9CF-40AE-B4C6-C98DA3205C09}" type="datetimeFigureOut">
               <a:rPr lang="en-US" smtClean="0"/>
               <a:pPr/>
-              <a:t>11/24/2020</a:t>
+              <a:t>12/8/2020</a:t>
             </a:fld>
             <a:endParaRPr lang="en-US"/>
           </a:p>
@@ -1088,7 +1088,7 @@
             <a:fld id="{1D8BD707-D9CF-40AE-B4C6-C98DA3205C09}" type="datetimeFigureOut">
               <a:rPr lang="en-US" smtClean="0"/>
               <a:pPr/>
-              <a:t>11/24/2020</a:t>
+              <a:t>12/8/2020</a:t>
             </a:fld>
             <a:endParaRPr lang="en-US"/>
           </a:p>
@@ -1255,7 +1255,7 @@
             <a:fld id="{1D8BD707-D9CF-40AE-B4C6-C98DA3205C09}" type="datetimeFigureOut">
               <a:rPr lang="en-US" smtClean="0"/>
               <a:pPr/>
-              <a:t>11/24/2020</a:t>
+              <a:t>12/8/2020</a:t>
             </a:fld>
             <a:endParaRPr lang="en-US"/>
           </a:p>
@@ -1498,7 +1498,7 @@
             <a:fld id="{1D8BD707-D9CF-40AE-B4C6-C98DA3205C09}" type="datetimeFigureOut">
               <a:rPr lang="en-US" smtClean="0"/>
               <a:pPr/>
-              <a:t>11/24/2020</a:t>
+              <a:t>12/8/2020</a:t>
             </a:fld>
             <a:endParaRPr lang="en-US"/>
           </a:p>
@@ -1783,7 +1783,7 @@
             <a:fld id="{1D8BD707-D9CF-40AE-B4C6-C98DA3205C09}" type="datetimeFigureOut">
               <a:rPr lang="en-US" smtClean="0"/>
               <a:pPr/>
-              <a:t>11/24/2020</a:t>
+              <a:t>12/8/2020</a:t>
             </a:fld>
             <a:endParaRPr lang="en-US"/>
           </a:p>
@@ -2202,7 +2202,7 @@
             <a:fld id="{1D8BD707-D9CF-40AE-B4C6-C98DA3205C09}" type="datetimeFigureOut">
               <a:rPr lang="en-US" smtClean="0"/>
               <a:pPr/>
-              <a:t>11/24/2020</a:t>
+              <a:t>12/8/2020</a:t>
             </a:fld>
             <a:endParaRPr lang="en-US"/>
           </a:p>
@@ -2317,7 +2317,7 @@
             <a:fld id="{1D8BD707-D9CF-40AE-B4C6-C98DA3205C09}" type="datetimeFigureOut">
               <a:rPr lang="en-US" smtClean="0"/>
               <a:pPr/>
-              <a:t>11/24/2020</a:t>
+              <a:t>12/8/2020</a:t>
             </a:fld>
             <a:endParaRPr lang="en-US"/>
           </a:p>
@@ -2409,7 +2409,7 @@
             <a:fld id="{1D8BD707-D9CF-40AE-B4C6-C98DA3205C09}" type="datetimeFigureOut">
               <a:rPr lang="en-US" smtClean="0"/>
               <a:pPr/>
-              <a:t>11/24/2020</a:t>
+              <a:t>12/8/2020</a:t>
             </a:fld>
             <a:endParaRPr lang="en-US"/>
           </a:p>
@@ -2683,7 +2683,7 @@
             <a:fld id="{1D8BD707-D9CF-40AE-B4C6-C98DA3205C09}" type="datetimeFigureOut">
               <a:rPr lang="en-US" smtClean="0"/>
               <a:pPr/>
-              <a:t>11/24/2020</a:t>
+              <a:t>12/8/2020</a:t>
             </a:fld>
             <a:endParaRPr lang="en-US"/>
           </a:p>
@@ -2933,7 +2933,7 @@
             <a:fld id="{1D8BD707-D9CF-40AE-B4C6-C98DA3205C09}" type="datetimeFigureOut">
               <a:rPr lang="en-US" smtClean="0"/>
               <a:pPr/>
-              <a:t>11/24/2020</a:t>
+              <a:t>12/8/2020</a:t>
             </a:fld>
             <a:endParaRPr lang="en-US"/>
           </a:p>
@@ -3143,7 +3143,7 @@
             <a:fld id="{1D8BD707-D9CF-40AE-B4C6-C98DA3205C09}" type="datetimeFigureOut">
               <a:rPr lang="en-US" smtClean="0"/>
               <a:pPr/>
-              <a:t>11/24/2020</a:t>
+              <a:t>12/8/2020</a:t>
             </a:fld>
             <a:endParaRPr lang="en-US"/>
           </a:p>
@@ -3544,7 +3544,11 @@
           <a:p>
             <a:r>
               <a:rPr lang="en-US" altLang="zh-CN" b="1" dirty="0"/>
-              <a:t>The exploration and research of obesity</a:t>
+              <a:t>The exploration and </a:t>
+            </a:r>
+            <a:r>
+              <a:rPr lang="en-US" altLang="zh-CN" b="1" dirty="0" smtClean="0"/>
+              <a:t>research Birds strikes</a:t>
             </a:r>
             <a:endParaRPr lang="zh-CN" altLang="en-US" dirty="0"/>
           </a:p>
@@ -3559,7 +3563,7 @@
         <p:spPr>
           <a:xfrm>
             <a:off x="0" y="990600"/>
-            <a:ext cx="8077200" cy="6124754"/>
+            <a:ext cx="8077200" cy="5878532"/>
           </a:xfrm>
           <a:prstGeom prst="rect">
             <a:avLst/>
@@ -3608,16 +3612,27 @@
             <a:r>
               <a:rPr lang="en-US" altLang="zh-CN" sz="1600" dirty="0">
                 <a:latin typeface="Times New Roman" panose="02020603050405020304" pitchFamily="18" charset="0"/>
-                <a:ea typeface="SimSun" panose="02010600030101010101" pitchFamily="2" charset="-122"/>
-                <a:cs typeface="SimSun" panose="02010600030101010101" pitchFamily="2" charset="-122"/>
-              </a:rPr>
-              <a:t>We are Obesity Canada, which is Canada’s leading obesity charity, made up of healthcare professionals, researchers, policy makers and people with an interest in obesity.  As A growing number of people are suffering from obesity. Our organization decide to find the major causes of obesity through data research and provide some health advice for individuals and help them manage and overcome obesity.</a:t>
-            </a:r>
-            <a:endParaRPr lang="zh-CN" altLang="zh-CN" sz="1600" dirty="0">
-              <a:latin typeface="SimSun" panose="02010600030101010101" pitchFamily="2" charset="-122"/>
-              <a:ea typeface="SimSun" panose="02010600030101010101" pitchFamily="2" charset="-122"/>
-              <a:cs typeface="SimSun" panose="02010600030101010101" pitchFamily="2" charset="-122"/>
-            </a:endParaRPr>
+                <a:ea typeface="Tahoma" panose="020B0604030504040204" pitchFamily="34" charset="0"/>
+                <a:cs typeface="Times New Roman" panose="02020603050405020304" pitchFamily="18" charset="0"/>
+              </a:rPr>
+              <a:t>We are Federal Aviation Administration, which is the largest modern transportation agency and a governmental body of the United States with powers to regulate all aspects of civil </a:t>
+            </a:r>
+            <a:r>
+              <a:rPr lang="en-US" altLang="zh-CN" sz="1600" dirty="0" smtClean="0">
+                <a:latin typeface="Times New Roman" panose="02020603050405020304" pitchFamily="18" charset="0"/>
+                <a:ea typeface="Tahoma" panose="020B0604030504040204" pitchFamily="34" charset="0"/>
+                <a:cs typeface="Times New Roman" panose="02020603050405020304" pitchFamily="18" charset="0"/>
+              </a:rPr>
+              <a:t>aviation. </a:t>
+            </a:r>
+            <a:r>
+              <a:rPr lang="en-US" altLang="zh-CN" sz="1600" dirty="0">
+                <a:latin typeface="Times New Roman" panose="02020603050405020304" pitchFamily="18" charset="0"/>
+                <a:ea typeface="Tahoma" panose="020B0604030504040204" pitchFamily="34" charset="0"/>
+                <a:cs typeface="Times New Roman" panose="02020603050405020304" pitchFamily="18" charset="0"/>
+              </a:rPr>
+              <a:t>During the past century, wildlife-aircraft strikes have resulted in the loss of hundreds of lives worldwide, as well as billions of dollars in aircraft damage. As a result of the increase in wildlife strikes, we decide to analyze wildlife strike hazard including caused factors, loss. Finally produce some suggestions to improve the airfield wildlife management. </a:t>
+            </a:r>
           </a:p>
           <a:p>
             <a:pPr>
@@ -3640,81 +3655,65 @@
             </a:endParaRPr>
           </a:p>
           <a:p>
+            <a:r>
+              <a:rPr lang="en-US" altLang="zh-CN" sz="1600" dirty="0">
+                <a:latin typeface="Times New Roman" panose="02020603050405020304" pitchFamily="18" charset="0"/>
+                <a:cs typeface="Times New Roman" panose="02020603050405020304" pitchFamily="18" charset="0"/>
+              </a:rPr>
+              <a:t>Identify the main causes of wildlife strike hazard and provide advice for improving the airfield </a:t>
+            </a:r>
+            <a:endParaRPr lang="en-US" altLang="zh-CN" sz="1600" dirty="0" smtClean="0">
+              <a:latin typeface="Times New Roman" panose="02020603050405020304" pitchFamily="18" charset="0"/>
+              <a:cs typeface="Times New Roman" panose="02020603050405020304" pitchFamily="18" charset="0"/>
+            </a:endParaRPr>
+          </a:p>
+          <a:p>
+            <a:endParaRPr lang="en-US" altLang="zh-CN" sz="1600" dirty="0">
+              <a:latin typeface="Times New Roman" panose="02020603050405020304" pitchFamily="18" charset="0"/>
+              <a:cs typeface="Times New Roman" panose="02020603050405020304" pitchFamily="18" charset="0"/>
+            </a:endParaRPr>
+          </a:p>
+          <a:p>
+            <a:r>
+              <a:rPr lang="en-US" altLang="zh-CN" sz="1600" dirty="0" smtClean="0">
+                <a:latin typeface="Times New Roman" panose="02020603050405020304" pitchFamily="18" charset="0"/>
+                <a:cs typeface="Times New Roman" panose="02020603050405020304" pitchFamily="18" charset="0"/>
+              </a:rPr>
+              <a:t>wildlife </a:t>
+            </a:r>
+            <a:r>
+              <a:rPr lang="en-US" altLang="zh-CN" sz="1600" dirty="0">
+                <a:latin typeface="Times New Roman" panose="02020603050405020304" pitchFamily="18" charset="0"/>
+                <a:cs typeface="Times New Roman" panose="02020603050405020304" pitchFamily="18" charset="0"/>
+              </a:rPr>
+              <a:t>management.</a:t>
+            </a:r>
+            <a:endParaRPr lang="zh-CN" altLang="zh-CN" sz="1600" dirty="0">
+              <a:latin typeface="Times New Roman" panose="02020603050405020304" pitchFamily="18" charset="0"/>
+              <a:cs typeface="Times New Roman" panose="02020603050405020304" pitchFamily="18" charset="0"/>
+            </a:endParaRPr>
+          </a:p>
+          <a:p>
             <a:pPr>
               <a:lnSpc>
                 <a:spcPct val="200000"/>
               </a:lnSpc>
             </a:pPr>
             <a:r>
-              <a:rPr lang="en-US" altLang="zh-CN" sz="1600" dirty="0" smtClean="0">
+              <a:rPr lang="en-US" altLang="zh-CN" sz="2000" b="1" dirty="0" smtClean="0">
                 <a:latin typeface="Times New Roman" panose="02020603050405020304" pitchFamily="18" charset="0"/>
                 <a:ea typeface="SimSun" panose="02010600030101010101" pitchFamily="2" charset="-122"/>
                 <a:cs typeface="SimSun" panose="02010600030101010101" pitchFamily="2" charset="-122"/>
               </a:rPr>
-              <a:t>The </a:t>
-            </a:r>
-            <a:r>
-              <a:rPr lang="en-US" altLang="zh-CN" sz="1600" dirty="0">
+              <a:t>Data </a:t>
+            </a:r>
+            <a:r>
+              <a:rPr lang="en-US" altLang="zh-CN" sz="2000" b="1" dirty="0">
                 <a:latin typeface="Times New Roman" panose="02020603050405020304" pitchFamily="18" charset="0"/>
                 <a:ea typeface="SimSun" panose="02010600030101010101" pitchFamily="2" charset="-122"/>
                 <a:cs typeface="SimSun" panose="02010600030101010101" pitchFamily="2" charset="-122"/>
               </a:rPr>
-              <a:t>project will analyze the dataset through the data visualization tool named Tableau. Identify </a:t>
-            </a:r>
-            <a:r>
-              <a:rPr lang="en-US" altLang="zh-CN" sz="1600" dirty="0" smtClean="0">
-                <a:latin typeface="Times New Roman" panose="02020603050405020304" pitchFamily="18" charset="0"/>
-                <a:ea typeface="SimSun" panose="02010600030101010101" pitchFamily="2" charset="-122"/>
-                <a:cs typeface="SimSun" panose="02010600030101010101" pitchFamily="2" charset="-122"/>
-              </a:rPr>
-              <a:t>the status and the </a:t>
-            </a:r>
-            <a:r>
-              <a:rPr lang="en-US" altLang="zh-CN" sz="1600" dirty="0">
-                <a:latin typeface="Times New Roman" panose="02020603050405020304" pitchFamily="18" charset="0"/>
-                <a:ea typeface="SimSun" panose="02010600030101010101" pitchFamily="2" charset="-122"/>
-                <a:cs typeface="SimSun" panose="02010600030101010101" pitchFamily="2" charset="-122"/>
-              </a:rPr>
-              <a:t>main causes of </a:t>
-            </a:r>
-            <a:r>
-              <a:rPr lang="en-US" altLang="zh-CN" sz="1600" dirty="0" smtClean="0">
-                <a:latin typeface="Times New Roman" panose="02020603050405020304" pitchFamily="18" charset="0"/>
-                <a:ea typeface="SimSun" panose="02010600030101010101" pitchFamily="2" charset="-122"/>
-                <a:cs typeface="SimSun" panose="02010600030101010101" pitchFamily="2" charset="-122"/>
-              </a:rPr>
-              <a:t>obesity. Finally produce </a:t>
-            </a:r>
-            <a:r>
-              <a:rPr lang="en-US" altLang="zh-CN" sz="1600" dirty="0">
-                <a:latin typeface="Times New Roman" panose="02020603050405020304" pitchFamily="18" charset="0"/>
-                <a:ea typeface="SimSun" panose="02010600030101010101" pitchFamily="2" charset="-122"/>
-                <a:cs typeface="SimSun" panose="02010600030101010101" pitchFamily="2" charset="-122"/>
-              </a:rPr>
-              <a:t>health advises for individuals</a:t>
-            </a:r>
-            <a:r>
-              <a:rPr lang="en-US" altLang="zh-CN" sz="1600" dirty="0" smtClean="0">
-                <a:latin typeface="Times New Roman" panose="02020603050405020304" pitchFamily="18" charset="0"/>
-                <a:ea typeface="SimSun" panose="02010600030101010101" pitchFamily="2" charset="-122"/>
-                <a:cs typeface="SimSun" panose="02010600030101010101" pitchFamily="2" charset="-122"/>
-              </a:rPr>
-              <a:t>.</a:t>
-            </a:r>
-          </a:p>
-          <a:p>
-            <a:pPr>
-              <a:lnSpc>
-                <a:spcPct val="200000"/>
-              </a:lnSpc>
-            </a:pPr>
-            <a:r>
-              <a:rPr lang="en-US" altLang="zh-CN" sz="2000" b="1" dirty="0">
-                <a:latin typeface="Times New Roman" panose="02020603050405020304" pitchFamily="18" charset="0"/>
-                <a:ea typeface="SimSun" panose="02010600030101010101" pitchFamily="2" charset="-122"/>
-                <a:cs typeface="SimSun" panose="02010600030101010101" pitchFamily="2" charset="-122"/>
-              </a:rPr>
-              <a:t>Data Set </a:t>
+              <a:t>Set </a:t>
             </a:r>
             <a:r>
               <a:rPr lang="en-US" altLang="zh-CN" sz="2000" b="1" dirty="0" smtClean="0">
@@ -3737,63 +3736,20 @@
                 <a:ea typeface="SimSun" panose="02010600030101010101" pitchFamily="2" charset="-122"/>
                 <a:cs typeface="SimSun" panose="02010600030101010101" pitchFamily="2" charset="-122"/>
               </a:rPr>
-              <a:t>Dataset: ObesityDataSet_raw_and_data_sinthetic.csv</a:t>
-            </a:r>
-            <a:endParaRPr lang="zh-CN" altLang="zh-CN" sz="1600" dirty="0">
-              <a:latin typeface="Times New Roman" panose="02020603050405020304" pitchFamily="18" charset="0"/>
-              <a:ea typeface="SimSun" panose="02010600030101010101" pitchFamily="2" charset="-122"/>
-              <a:cs typeface="SimSun" panose="02010600030101010101" pitchFamily="2" charset="-122"/>
-            </a:endParaRPr>
-          </a:p>
-          <a:p>
-            <a:pPr>
-              <a:lnSpc>
-                <a:spcPct val="200000"/>
-              </a:lnSpc>
-            </a:pPr>
-            <a:endParaRPr lang="zh-CN" altLang="zh-CN" sz="1600" dirty="0">
-              <a:solidFill>
-                <a:schemeClr val="accent1">
-                  <a:lumMod val="75000"/>
-                </a:schemeClr>
-              </a:solidFill>
-              <a:latin typeface="SimSun" panose="02010600030101010101" pitchFamily="2" charset="-122"/>
-              <a:ea typeface="SimSun" panose="02010600030101010101" pitchFamily="2" charset="-122"/>
-              <a:cs typeface="SimSun" panose="02010600030101010101" pitchFamily="2" charset="-122"/>
-            </a:endParaRPr>
-          </a:p>
-        </p:txBody>
-      </p:sp>
-      <p:pic>
-        <p:nvPicPr>
-          <p:cNvPr id="5" name="Picture 4"/>
-          <p:cNvPicPr>
-            <a:picLocks noChangeAspect="1"/>
-          </p:cNvPicPr>
-          <p:nvPr/>
-        </p:nvPicPr>
-        <p:blipFill>
-          <a:blip r:embed="rId3">
-            <a:extLst>
-              <a:ext uri="{28A0092B-C50C-407E-A947-70E740481C1C}">
-                <a14:useLocalDpi xmlns:a14="http://schemas.microsoft.com/office/drawing/2010/main" val="0"/>
-              </a:ext>
-            </a:extLst>
-          </a:blip>
-          <a:stretch>
-            <a:fillRect/>
-          </a:stretch>
-        </p:blipFill>
-        <p:spPr>
-          <a:xfrm>
-            <a:off x="8041860" y="2057400"/>
-            <a:ext cx="4378739" cy="4953000"/>
-          </a:xfrm>
-          <a:prstGeom prst="rect">
-            <a:avLst/>
-          </a:prstGeom>
-        </p:spPr>
-      </p:pic>
+              <a:t>Dataset: </a:t>
+            </a:r>
+            <a:r>
+              <a:rPr lang="en-US" altLang="zh-CN" sz="1600" dirty="0"/>
+              <a:t>Bird </a:t>
+            </a:r>
+            <a:r>
+              <a:rPr lang="en-US" altLang="zh-CN" sz="1600" dirty="0" smtClean="0"/>
+              <a:t>Strikes.csv</a:t>
+            </a:r>
+            <a:endParaRPr lang="zh-CN" altLang="zh-CN" sz="1600" dirty="0"/>
+          </a:p>
+        </p:txBody>
+      </p:sp>
     </p:spTree>
     <p:extLst>
       <p:ext uri="{BB962C8B-B14F-4D97-AF65-F5344CB8AC3E}">
@@ -3833,7 +3789,7 @@
       </p:grpSpPr>
       <p:pic>
         <p:nvPicPr>
-          <p:cNvPr id="4" name="Picture 3"/>
+          <p:cNvPr id="3" name="Picture 2"/>
           <p:cNvPicPr>
             <a:picLocks noChangeAspect="1"/>
           </p:cNvPicPr>
@@ -3847,8 +3803,8 @@
         </p:blipFill>
         <p:spPr>
           <a:xfrm>
-            <a:off x="230947" y="673247"/>
-            <a:ext cx="3547583" cy="2159096"/>
+            <a:off x="0" y="12192"/>
+            <a:ext cx="12192000" cy="1207008"/>
           </a:xfrm>
           <a:prstGeom prst="rect">
             <a:avLst/>
@@ -3857,7 +3813,7 @@
       </p:pic>
       <p:pic>
         <p:nvPicPr>
-          <p:cNvPr id="5" name="Picture 4"/>
+          <p:cNvPr id="4" name="Picture 3"/>
           <p:cNvPicPr>
             <a:picLocks noChangeAspect="1"/>
           </p:cNvPicPr>
@@ -3871,8 +3827,8 @@
         </p:blipFill>
         <p:spPr>
           <a:xfrm>
-            <a:off x="4205089" y="760113"/>
-            <a:ext cx="3216659" cy="2089887"/>
+            <a:off x="0" y="1219201"/>
+            <a:ext cx="3505200" cy="2286000"/>
           </a:xfrm>
           <a:prstGeom prst="rect">
             <a:avLst/>
@@ -3895,214 +3851,14 @@
         </p:blipFill>
         <p:spPr>
           <a:xfrm>
-            <a:off x="7859618" y="769257"/>
-            <a:ext cx="3819448" cy="2117405"/>
+            <a:off x="3490913" y="1222250"/>
+            <a:ext cx="8696325" cy="4416550"/>
           </a:xfrm>
           <a:prstGeom prst="rect">
             <a:avLst/>
           </a:prstGeom>
         </p:spPr>
       </p:pic>
-      <p:sp>
-        <p:nvSpPr>
-          <p:cNvPr id="7" name="Rectangle 6"/>
-          <p:cNvSpPr/>
-          <p:nvPr/>
-        </p:nvSpPr>
-        <p:spPr>
-          <a:xfrm>
-            <a:off x="58552" y="2856963"/>
-            <a:ext cx="4038600" cy="338554"/>
-          </a:xfrm>
-          <a:prstGeom prst="rect">
-            <a:avLst/>
-          </a:prstGeom>
-        </p:spPr>
-        <p:txBody>
-          <a:bodyPr wrap="square">
-            <a:spAutoFit/>
-          </a:bodyPr>
-          <a:lstStyle/>
-          <a:p>
-            <a:r>
-              <a:rPr lang="en-CA" altLang="zh-CN" sz="1600" dirty="0">
-                <a:solidFill>
-                  <a:srgbClr val="FF0000"/>
-                </a:solidFill>
-                <a:latin typeface="Helvetica Neue"/>
-              </a:rPr>
-              <a:t>46% are obese,27.5% are </a:t>
-            </a:r>
-            <a:r>
-              <a:rPr lang="en-CA" altLang="zh-CN" sz="1600" dirty="0" smtClean="0">
-                <a:solidFill>
-                  <a:srgbClr val="FF0000"/>
-                </a:solidFill>
-                <a:latin typeface="Helvetica Neue"/>
-              </a:rPr>
-              <a:t>overweight</a:t>
-            </a:r>
-            <a:endParaRPr lang="zh-CN" altLang="en-US" sz="1600" dirty="0">
-              <a:solidFill>
-                <a:srgbClr val="FF0000"/>
-              </a:solidFill>
-            </a:endParaRPr>
-          </a:p>
-        </p:txBody>
-      </p:sp>
-      <p:sp>
-        <p:nvSpPr>
-          <p:cNvPr id="8" name="Rectangle 7"/>
-          <p:cNvSpPr/>
-          <p:nvPr/>
-        </p:nvSpPr>
-        <p:spPr>
-          <a:xfrm>
-            <a:off x="4128836" y="2849322"/>
-            <a:ext cx="3515706" cy="338554"/>
-          </a:xfrm>
-          <a:prstGeom prst="rect">
-            <a:avLst/>
-          </a:prstGeom>
-        </p:spPr>
-        <p:txBody>
-          <a:bodyPr wrap="none">
-            <a:spAutoFit/>
-          </a:bodyPr>
-          <a:lstStyle/>
-          <a:p>
-            <a:r>
-              <a:rPr lang="en-US" altLang="zh-CN" sz="1600" dirty="0">
-                <a:solidFill>
-                  <a:srgbClr val="FF0000"/>
-                </a:solidFill>
-                <a:latin typeface="Helvetica Neue"/>
-              </a:rPr>
-              <a:t>Many youth are struggle with obesity</a:t>
-            </a:r>
-            <a:endParaRPr lang="zh-CN" altLang="en-US" sz="1600" dirty="0">
-              <a:solidFill>
-                <a:srgbClr val="FF0000"/>
-              </a:solidFill>
-              <a:latin typeface="Helvetica Neue"/>
-            </a:endParaRPr>
-          </a:p>
-        </p:txBody>
-      </p:sp>
-      <p:sp>
-        <p:nvSpPr>
-          <p:cNvPr id="9" name="Rectangle 8"/>
-          <p:cNvSpPr/>
-          <p:nvPr/>
-        </p:nvSpPr>
-        <p:spPr>
-          <a:xfrm>
-            <a:off x="7676226" y="2832343"/>
-            <a:ext cx="4847289" cy="338554"/>
-          </a:xfrm>
-          <a:prstGeom prst="rect">
-            <a:avLst/>
-          </a:prstGeom>
-        </p:spPr>
-        <p:txBody>
-          <a:bodyPr wrap="none">
-            <a:spAutoFit/>
-          </a:bodyPr>
-          <a:lstStyle/>
-          <a:p>
-            <a:r>
-              <a:rPr lang="en-US" altLang="zh-CN" sz="1600" dirty="0">
-                <a:solidFill>
-                  <a:srgbClr val="FF0000"/>
-                </a:solidFill>
-                <a:latin typeface="Helvetica Neue"/>
-              </a:rPr>
-              <a:t>Obesity and overweight can affect next generations</a:t>
-            </a:r>
-            <a:endParaRPr lang="zh-CN" altLang="en-US" sz="1600" dirty="0">
-              <a:solidFill>
-                <a:srgbClr val="FF0000"/>
-              </a:solidFill>
-              <a:latin typeface="Helvetica Neue"/>
-            </a:endParaRPr>
-          </a:p>
-        </p:txBody>
-      </p:sp>
-      <p:sp>
-        <p:nvSpPr>
-          <p:cNvPr id="12" name="Rectangle 11"/>
-          <p:cNvSpPr/>
-          <p:nvPr/>
-        </p:nvSpPr>
-        <p:spPr>
-          <a:xfrm>
-            <a:off x="873257" y="9741"/>
-            <a:ext cx="10629320" cy="369332"/>
-          </a:xfrm>
-          <a:prstGeom prst="rect">
-            <a:avLst/>
-          </a:prstGeom>
-        </p:spPr>
-        <p:txBody>
-          <a:bodyPr wrap="none">
-            <a:spAutoFit/>
-          </a:bodyPr>
-          <a:lstStyle/>
-          <a:p>
-            <a:r>
-              <a:rPr lang="en-US" altLang="zh-CN" dirty="0" smtClean="0">
-                <a:solidFill>
-                  <a:srgbClr val="FF0000"/>
-                </a:solidFill>
-              </a:rPr>
-              <a:t>We are facing serious overweight and obesity problem, we need to find main causes and take actions right now!</a:t>
-            </a:r>
-            <a:endParaRPr lang="zh-CN" altLang="en-US" dirty="0">
-              <a:solidFill>
-                <a:srgbClr val="FF0000"/>
-              </a:solidFill>
-            </a:endParaRPr>
-          </a:p>
-        </p:txBody>
-      </p:sp>
-      <p:sp>
-        <p:nvSpPr>
-          <p:cNvPr id="13" name="Double Brace 12"/>
-          <p:cNvSpPr/>
-          <p:nvPr/>
-        </p:nvSpPr>
-        <p:spPr>
-          <a:xfrm rot="5400000">
-            <a:off x="4533474" y="-3834376"/>
-            <a:ext cx="3231701" cy="11658600"/>
-          </a:xfrm>
-          <a:prstGeom prst="bracePair">
-            <a:avLst/>
-          </a:prstGeom>
-        </p:spPr>
-        <p:style>
-          <a:lnRef idx="1">
-            <a:schemeClr val="accent1"/>
-          </a:lnRef>
-          <a:fillRef idx="0">
-            <a:schemeClr val="accent1"/>
-          </a:fillRef>
-          <a:effectRef idx="0">
-            <a:schemeClr val="accent1"/>
-          </a:effectRef>
-          <a:fontRef idx="minor">
-            <a:schemeClr val="tx1"/>
-          </a:fontRef>
-        </p:style>
-        <p:txBody>
-          <a:bodyPr rtlCol="0" anchor="ctr"/>
-          <a:lstStyle/>
-          <a:p>
-            <a:pPr algn="ctr"/>
-            <a:endParaRPr lang="zh-CN" altLang="en-US"/>
-          </a:p>
-        </p:txBody>
-      </p:sp>
       <p:pic>
         <p:nvPicPr>
           <p:cNvPr id="2" name="Picture 1"/>
@@ -4119,54 +3875,17 @@
         </p:blipFill>
         <p:spPr>
           <a:xfrm>
-            <a:off x="349473" y="4018226"/>
-            <a:ext cx="3168934" cy="2693104"/>
+            <a:off x="0" y="5635750"/>
+            <a:ext cx="12187238" cy="1222250"/>
           </a:xfrm>
           <a:prstGeom prst="rect">
             <a:avLst/>
           </a:prstGeom>
         </p:spPr>
       </p:pic>
-      <p:sp>
-        <p:nvSpPr>
-          <p:cNvPr id="11" name="Rectangle 10"/>
-          <p:cNvSpPr/>
-          <p:nvPr/>
-        </p:nvSpPr>
-        <p:spPr>
-          <a:xfrm>
-            <a:off x="358617" y="3481956"/>
-            <a:ext cx="3559932" cy="584775"/>
-          </a:xfrm>
-          <a:prstGeom prst="rect">
-            <a:avLst/>
-          </a:prstGeom>
-        </p:spPr>
-        <p:txBody>
-          <a:bodyPr wrap="square">
-            <a:spAutoFit/>
-          </a:bodyPr>
-          <a:lstStyle/>
-          <a:p>
-            <a:r>
-              <a:rPr lang="en-US" altLang="zh-CN" sz="1600" dirty="0" smtClean="0">
-                <a:solidFill>
-                  <a:srgbClr val="FF0000"/>
-                </a:solidFill>
-              </a:rPr>
-              <a:t>High frequent of consumption high caloric food, high risk of obesity</a:t>
-            </a:r>
-            <a:endParaRPr lang="zh-CN" altLang="en-US" sz="1600" dirty="0">
-              <a:solidFill>
-                <a:srgbClr val="FF0000"/>
-              </a:solidFill>
-            </a:endParaRPr>
-          </a:p>
-        </p:txBody>
-      </p:sp>
       <p:pic>
         <p:nvPicPr>
-          <p:cNvPr id="14" name="Picture 13"/>
+          <p:cNvPr id="8" name="Picture 7"/>
           <p:cNvPicPr>
             <a:picLocks noChangeAspect="1"/>
           </p:cNvPicPr>
@@ -4180,89 +3899,14 @@
         </p:blipFill>
         <p:spPr>
           <a:xfrm>
-            <a:off x="3680611" y="3852248"/>
-            <a:ext cx="3632425" cy="2207043"/>
+            <a:off x="-1" y="3505200"/>
+            <a:ext cx="3486151" cy="2193539"/>
           </a:xfrm>
           <a:prstGeom prst="rect">
             <a:avLst/>
           </a:prstGeom>
         </p:spPr>
       </p:pic>
-      <p:sp>
-        <p:nvSpPr>
-          <p:cNvPr id="15" name="Rectangle 14"/>
-          <p:cNvSpPr/>
-          <p:nvPr/>
-        </p:nvSpPr>
-        <p:spPr>
-          <a:xfrm>
-            <a:off x="3548887" y="3562192"/>
-            <a:ext cx="5943600" cy="338554"/>
-          </a:xfrm>
-          <a:prstGeom prst="rect">
-            <a:avLst/>
-          </a:prstGeom>
-        </p:spPr>
-        <p:txBody>
-          <a:bodyPr wrap="square">
-            <a:spAutoFit/>
-          </a:bodyPr>
-          <a:lstStyle/>
-          <a:p>
-            <a:r>
-              <a:rPr lang="en-US" altLang="zh-CN" sz="1600" dirty="0" smtClean="0">
-                <a:solidFill>
-                  <a:srgbClr val="FF0000"/>
-                </a:solidFill>
-              </a:rPr>
-              <a:t>People who suffer obesity has low physical activity frequency</a:t>
-            </a:r>
-            <a:endParaRPr lang="zh-CN" altLang="en-US" sz="1600" dirty="0">
-              <a:solidFill>
-                <a:srgbClr val="FF0000"/>
-              </a:solidFill>
-            </a:endParaRPr>
-          </a:p>
-        </p:txBody>
-      </p:sp>
-      <p:sp>
-        <p:nvSpPr>
-          <p:cNvPr id="16" name="Double Brace 15"/>
-          <p:cNvSpPr/>
-          <p:nvPr/>
-        </p:nvSpPr>
-        <p:spPr>
-          <a:xfrm rot="5400000">
-            <a:off x="4160293" y="-763479"/>
-            <a:ext cx="3978063" cy="11508262"/>
-          </a:xfrm>
-          <a:prstGeom prst="bracePair">
-            <a:avLst/>
-          </a:prstGeom>
-        </p:spPr>
-        <p:style>
-          <a:lnRef idx="1">
-            <a:schemeClr val="accent1"/>
-          </a:lnRef>
-          <a:fillRef idx="0">
-            <a:schemeClr val="accent1"/>
-          </a:fillRef>
-          <a:effectRef idx="0">
-            <a:schemeClr val="accent1"/>
-          </a:effectRef>
-          <a:fontRef idx="minor">
-            <a:schemeClr val="tx1"/>
-          </a:fontRef>
-        </p:style>
-        <p:txBody>
-          <a:bodyPr rtlCol="0" anchor="ctr"/>
-          <a:lstStyle/>
-          <a:p>
-            <a:pPr algn="ctr"/>
-            <a:endParaRPr lang="zh-CN" altLang="en-US"/>
-          </a:p>
-        </p:txBody>
-      </p:sp>
     </p:spTree>
     <p:extLst>
       <p:ext uri="{BB962C8B-B14F-4D97-AF65-F5344CB8AC3E}">
@@ -4312,7 +3956,7 @@
         </p:nvSpPr>
         <p:spPr>
           <a:xfrm>
-            <a:off x="533400" y="0"/>
+            <a:off x="533400" y="381000"/>
             <a:ext cx="10972800" cy="1143000"/>
           </a:xfrm>
         </p:spPr>
@@ -4321,10 +3965,9 @@
           <a:lstStyle/>
           <a:p>
             <a:r>
-              <a:rPr lang="en-US" altLang="zh-CN" dirty="0" smtClean="0"/>
-              <a:t>Insights from the research</a:t>
-            </a:r>
-            <a:endParaRPr lang="zh-CN" altLang="en-US" dirty="0"/>
+              <a:rPr lang="en-CA" altLang="zh-CN" dirty="0"/>
+              <a:t>Conclusions and Suggestions</a:t>
+            </a:r>
           </a:p>
         </p:txBody>
       </p:sp>
@@ -4336,8 +3979,8 @@
         </p:nvSpPr>
         <p:spPr>
           <a:xfrm>
-            <a:off x="76200" y="1066800"/>
-            <a:ext cx="12192000" cy="6001643"/>
+            <a:off x="152400" y="1752600"/>
+            <a:ext cx="11734800" cy="4524315"/>
           </a:xfrm>
           <a:prstGeom prst="rect">
             <a:avLst/>
@@ -4349,22 +3992,147 @@
           </a:bodyPr>
           <a:lstStyle/>
           <a:p>
+            <a:pPr marL="457200" indent="-457200">
+              <a:lnSpc>
+                <a:spcPct val="200000"/>
+              </a:lnSpc>
+              <a:buFontTx/>
+              <a:buAutoNum type="arabicPeriod"/>
+            </a:pPr>
+            <a:r>
+              <a:rPr lang="en-CA" altLang="zh-CN" sz="1600" dirty="0">
+                <a:latin typeface="Times New Roman" panose="02020603050405020304" pitchFamily="18" charset="0"/>
+              </a:rPr>
+              <a:t>Airplane in the whole US are all suffer from wildlife strike, California is the most serious, it’s far more than other states</a:t>
+            </a:r>
+            <a:r>
+              <a:rPr lang="en-CA" altLang="zh-CN" sz="1600" dirty="0" smtClean="0">
+                <a:latin typeface="Times New Roman" panose="02020603050405020304" pitchFamily="18" charset="0"/>
+              </a:rPr>
+              <a:t>.</a:t>
+            </a:r>
+            <a:r>
+              <a:rPr lang="en-US" altLang="zh-CN" sz="1600" b="1" dirty="0" smtClean="0">
+                <a:latin typeface="Times New Roman" panose="02020603050405020304" pitchFamily="18" charset="0"/>
+              </a:rPr>
+              <a:t> </a:t>
+            </a:r>
+            <a:endParaRPr lang="en-US" altLang="zh-CN" sz="1600" dirty="0" smtClean="0">
+              <a:latin typeface="Times New Roman" panose="02020603050405020304" pitchFamily="18" charset="0"/>
+              <a:cs typeface="SimSun" panose="02010600030101010101" pitchFamily="2" charset="-122"/>
+            </a:endParaRPr>
+          </a:p>
+          <a:p>
+            <a:pPr marL="457200" indent="-457200">
+              <a:lnSpc>
+                <a:spcPct val="200000"/>
+              </a:lnSpc>
+              <a:buFontTx/>
+              <a:buAutoNum type="arabicPeriod"/>
+            </a:pPr>
+            <a:r>
+              <a:rPr lang="en-US" altLang="zh-CN" sz="1600" dirty="0" smtClean="0">
+                <a:latin typeface="Times New Roman" panose="02020603050405020304" pitchFamily="18" charset="0"/>
+                <a:cs typeface="SimSun" panose="02010600030101010101" pitchFamily="2" charset="-122"/>
+              </a:rPr>
+              <a:t>The birds stride are increasing year by year, and it happened </a:t>
+            </a:r>
+            <a:r>
+              <a:rPr lang="en-CA" altLang="zh-CN" sz="1600" dirty="0" smtClean="0">
+                <a:latin typeface="Times New Roman" panose="02020603050405020304" pitchFamily="18" charset="0"/>
+              </a:rPr>
+              <a:t>mostly </a:t>
+            </a:r>
+            <a:r>
+              <a:rPr lang="en-CA" altLang="zh-CN" sz="1600" dirty="0">
+                <a:latin typeface="Times New Roman" panose="02020603050405020304" pitchFamily="18" charset="0"/>
+              </a:rPr>
+              <a:t>between March to May, and July to </a:t>
+            </a:r>
+            <a:r>
+              <a:rPr lang="en-CA" altLang="zh-CN" sz="1600" dirty="0" smtClean="0">
+                <a:latin typeface="Times New Roman" panose="02020603050405020304" pitchFamily="18" charset="0"/>
+              </a:rPr>
+              <a:t>October. </a:t>
+            </a:r>
+            <a:r>
+              <a:rPr lang="en-CA" altLang="zh-CN" sz="1600" dirty="0" smtClean="0">
+                <a:solidFill>
+                  <a:srgbClr val="FF0000"/>
+                </a:solidFill>
+                <a:latin typeface="Times New Roman" panose="02020603050405020304" pitchFamily="18" charset="0"/>
+              </a:rPr>
+              <a:t>If </a:t>
+            </a:r>
+            <a:r>
+              <a:rPr lang="en-CA" altLang="zh-CN" sz="1600" dirty="0">
+                <a:solidFill>
+                  <a:srgbClr val="FF0000"/>
+                </a:solidFill>
+                <a:latin typeface="Times New Roman" panose="02020603050405020304" pitchFamily="18" charset="0"/>
+              </a:rPr>
+              <a:t>resources </a:t>
+            </a:r>
+            <a:r>
+              <a:rPr lang="en-CA" altLang="zh-CN" sz="1600" dirty="0" smtClean="0">
+                <a:solidFill>
+                  <a:srgbClr val="FF0000"/>
+                </a:solidFill>
+                <a:latin typeface="Times New Roman" panose="02020603050405020304" pitchFamily="18" charset="0"/>
+              </a:rPr>
+              <a:t>are</a:t>
+            </a:r>
+          </a:p>
+          <a:p>
             <a:pPr>
               <a:lnSpc>
                 <a:spcPct val="200000"/>
               </a:lnSpc>
             </a:pPr>
             <a:r>
-              <a:rPr lang="en-US" altLang="zh-CN" sz="2400" b="1" dirty="0" smtClean="0">
-                <a:latin typeface="Times New Roman" panose="02020603050405020304" pitchFamily="18" charset="0"/>
-                <a:ea typeface="SimSun" panose="02010600030101010101" pitchFamily="2" charset="-122"/>
-                <a:cs typeface="SimSun" panose="02010600030101010101" pitchFamily="2" charset="-122"/>
-              </a:rPr>
-              <a:t>Problems:</a:t>
-            </a:r>
-            <a:endParaRPr lang="zh-CN" altLang="zh-CN" dirty="0">
-              <a:latin typeface="SimSun" panose="02010600030101010101" pitchFamily="2" charset="-122"/>
-              <a:ea typeface="SimSun" panose="02010600030101010101" pitchFamily="2" charset="-122"/>
+              <a:rPr lang="en-CA" altLang="zh-CN" sz="1600" dirty="0" smtClean="0">
+                <a:solidFill>
+                  <a:srgbClr val="FF0000"/>
+                </a:solidFill>
+                <a:latin typeface="Times New Roman" panose="02020603050405020304" pitchFamily="18" charset="0"/>
+              </a:rPr>
+              <a:t>limited</a:t>
+            </a:r>
+            <a:r>
+              <a:rPr lang="en-CA" altLang="zh-CN" sz="1600" dirty="0">
+                <a:solidFill>
+                  <a:srgbClr val="FF0000"/>
+                </a:solidFill>
+                <a:latin typeface="Times New Roman" panose="02020603050405020304" pitchFamily="18" charset="0"/>
+              </a:rPr>
+              <a:t>, detection and </a:t>
+            </a:r>
+            <a:r>
+              <a:rPr lang="en-CA" altLang="zh-CN" sz="1600" dirty="0" smtClean="0">
+                <a:solidFill>
+                  <a:srgbClr val="FF0000"/>
+                </a:solidFill>
+                <a:latin typeface="Times New Roman" panose="02020603050405020304" pitchFamily="18" charset="0"/>
+              </a:rPr>
+              <a:t>countermeasures </a:t>
+            </a:r>
+            <a:r>
+              <a:rPr lang="en-CA" altLang="zh-CN" sz="1600" dirty="0">
+                <a:solidFill>
+                  <a:srgbClr val="FF0000"/>
+                </a:solidFill>
+                <a:latin typeface="Times New Roman" panose="02020603050405020304" pitchFamily="18" charset="0"/>
+              </a:rPr>
+              <a:t>should be optimized during such times to prevent bird strikes as much as possible</a:t>
+            </a:r>
+            <a:r>
+              <a:rPr lang="en-CA" altLang="zh-CN" sz="1600" dirty="0" smtClean="0">
+                <a:latin typeface="Times New Roman" panose="02020603050405020304" pitchFamily="18" charset="0"/>
+              </a:rPr>
+              <a:t>.</a:t>
+            </a:r>
+            <a:endParaRPr lang="en-US" altLang="zh-CN" sz="1600" dirty="0" smtClean="0">
+              <a:latin typeface="Times New Roman" panose="02020603050405020304" pitchFamily="18" charset="0"/>
               <a:cs typeface="SimSun" panose="02010600030101010101" pitchFamily="2" charset="-122"/>
             </a:endParaRPr>
           </a:p>
@@ -4375,132 +4143,229 @@
               </a:lnSpc>
             </a:pPr>
             <a:r>
-              <a:rPr lang="en-US" altLang="zh-CN" dirty="0" smtClean="0"/>
-              <a:t>Through the research, we can see people </a:t>
-            </a:r>
-            <a:r>
-              <a:rPr lang="en-US" altLang="zh-CN" dirty="0"/>
-              <a:t>are facing serious overweight and obesity </a:t>
-            </a:r>
-            <a:r>
-              <a:rPr lang="en-US" altLang="zh-CN" dirty="0" smtClean="0"/>
-              <a:t>problem, especially youth.</a:t>
-            </a:r>
-          </a:p>
-          <a:p>
-            <a:pPr>
+              <a:rPr lang="en-US" altLang="zh-CN" sz="1600" dirty="0" smtClean="0">
+                <a:latin typeface="Times New Roman" panose="02020603050405020304" pitchFamily="18" charset="0"/>
+                <a:cs typeface="SimSun" panose="02010600030101010101" pitchFamily="2" charset="-122"/>
+              </a:rPr>
+              <a:t>3.      </a:t>
+            </a:r>
+            <a:r>
+              <a:rPr lang="en-CA" altLang="zh-CN" sz="1600" dirty="0" smtClean="0">
+                <a:latin typeface="Times New Roman" panose="02020603050405020304" pitchFamily="18" charset="0"/>
+              </a:rPr>
+              <a:t>Wildlife </a:t>
+            </a:r>
+            <a:r>
+              <a:rPr lang="en-CA" altLang="zh-CN" sz="1600" dirty="0">
+                <a:latin typeface="Times New Roman" panose="02020603050405020304" pitchFamily="18" charset="0"/>
+              </a:rPr>
+              <a:t>strikes happen most often during takeoff or climbing, and during low altitude and low speed flights. </a:t>
+            </a:r>
+            <a:r>
+              <a:rPr lang="en-CA" altLang="zh-CN" sz="1600" dirty="0">
+                <a:solidFill>
+                  <a:srgbClr val="FF0000"/>
+                </a:solidFill>
+                <a:latin typeface="Times New Roman" panose="02020603050405020304" pitchFamily="18" charset="0"/>
+              </a:rPr>
+              <a:t>Pilots should be informed with bird information during the approach phase if possible.</a:t>
+            </a:r>
+          </a:p>
+          <a:p>
+            <a:pPr marL="342900" indent="-342900">
               <a:lnSpc>
                 <a:spcPct val="200000"/>
               </a:lnSpc>
+              <a:buFontTx/>
+              <a:buAutoNum type="arabicPeriod" startAt="4"/>
             </a:pPr>
             <a:r>
-              <a:rPr lang="en-US" altLang="zh-CN" dirty="0" smtClean="0"/>
-              <a:t>Not only the high present of people are suffering from obesity, but also can affect the next generation.</a:t>
-            </a:r>
-          </a:p>
-          <a:p>
-            <a:pPr>
+              <a:rPr lang="en-US" altLang="zh-CN" sz="1600" dirty="0" smtClean="0">
+                <a:latin typeface="Times New Roman" panose="02020603050405020304" pitchFamily="18" charset="0"/>
+                <a:cs typeface="SimSun" panose="02010600030101010101" pitchFamily="2" charset="-122"/>
+              </a:rPr>
+              <a:t>  Canada </a:t>
+            </a:r>
+            <a:r>
+              <a:rPr lang="en-US" altLang="zh-CN" sz="1600" dirty="0">
+                <a:latin typeface="Times New Roman" panose="02020603050405020304" pitchFamily="18" charset="0"/>
+                <a:cs typeface="SimSun" panose="02010600030101010101" pitchFamily="2" charset="-122"/>
+              </a:rPr>
+              <a:t>goose </a:t>
+            </a:r>
+            <a:r>
+              <a:rPr lang="en-CA" altLang="zh-CN" sz="1600" dirty="0" smtClean="0">
+                <a:latin typeface="Times New Roman" panose="02020603050405020304" pitchFamily="18" charset="0"/>
+              </a:rPr>
+              <a:t>are </a:t>
+            </a:r>
+            <a:r>
+              <a:rPr lang="en-CA" altLang="zh-CN" sz="1600" dirty="0">
+                <a:latin typeface="Times New Roman" panose="02020603050405020304" pitchFamily="18" charset="0"/>
+              </a:rPr>
+              <a:t>the most frequently involved in bird </a:t>
+            </a:r>
+            <a:r>
+              <a:rPr lang="en-CA" altLang="zh-CN" sz="1600" dirty="0" smtClean="0">
+                <a:latin typeface="Times New Roman" panose="02020603050405020304" pitchFamily="18" charset="0"/>
+              </a:rPr>
+              <a:t>strikes, </a:t>
+            </a:r>
+            <a:r>
+              <a:rPr lang="en-CA" altLang="zh-CN" sz="1600" dirty="0" smtClean="0">
+                <a:solidFill>
+                  <a:srgbClr val="FF0000"/>
+                </a:solidFill>
+                <a:latin typeface="Times New Roman" panose="02020603050405020304" pitchFamily="18" charset="0"/>
+              </a:rPr>
+              <a:t>so </a:t>
+            </a:r>
+            <a:r>
+              <a:rPr lang="en-CA" altLang="zh-CN" sz="1600" dirty="0">
+                <a:solidFill>
+                  <a:srgbClr val="FF0000"/>
+                </a:solidFill>
+                <a:latin typeface="Times New Roman" panose="02020603050405020304" pitchFamily="18" charset="0"/>
+              </a:rPr>
+              <a:t>Airports built near migration route of </a:t>
+            </a:r>
+            <a:r>
+              <a:rPr lang="en-CA" altLang="zh-CN" sz="1600" dirty="0" smtClean="0">
+                <a:solidFill>
+                  <a:srgbClr val="FF0000"/>
+                </a:solidFill>
+                <a:latin typeface="Times New Roman" panose="02020603050405020304" pitchFamily="18" charset="0"/>
+              </a:rPr>
+              <a:t>birds </a:t>
+            </a:r>
+            <a:r>
+              <a:rPr lang="en-CA" altLang="zh-CN" sz="1600" dirty="0">
+                <a:solidFill>
+                  <a:srgbClr val="FF0000"/>
+                </a:solidFill>
+                <a:latin typeface="Times New Roman" panose="02020603050405020304" pitchFamily="18" charset="0"/>
+              </a:rPr>
+              <a:t>should have </a:t>
+            </a:r>
+            <a:r>
+              <a:rPr lang="en-CA" altLang="zh-CN" sz="1600" dirty="0" smtClean="0">
+                <a:solidFill>
+                  <a:srgbClr val="FF0000"/>
+                </a:solidFill>
+                <a:latin typeface="Times New Roman" panose="02020603050405020304" pitchFamily="18" charset="0"/>
+              </a:rPr>
+              <a:t>more countermeasures </a:t>
+            </a:r>
+            <a:r>
+              <a:rPr lang="en-CA" altLang="zh-CN" sz="1600" dirty="0">
+                <a:solidFill>
+                  <a:srgbClr val="FF0000"/>
+                </a:solidFill>
+                <a:latin typeface="Times New Roman" panose="02020603050405020304" pitchFamily="18" charset="0"/>
+              </a:rPr>
+              <a:t>in place</a:t>
+            </a:r>
+            <a:r>
+              <a:rPr lang="en-CA" altLang="zh-CN" sz="1600" dirty="0" smtClean="0">
+                <a:solidFill>
+                  <a:srgbClr val="FF0000"/>
+                </a:solidFill>
+                <a:latin typeface="Times New Roman" panose="02020603050405020304" pitchFamily="18" charset="0"/>
+              </a:rPr>
+              <a:t>.</a:t>
+            </a:r>
+          </a:p>
+          <a:p>
+            <a:pPr marL="342900" indent="-342900">
               <a:lnSpc>
                 <a:spcPct val="200000"/>
               </a:lnSpc>
+              <a:buFontTx/>
+              <a:buAutoNum type="arabicPeriod" startAt="4"/>
             </a:pPr>
             <a:r>
-              <a:rPr lang="en-US" altLang="zh-CN" dirty="0" smtClean="0"/>
-              <a:t> Obesity has high correlation with </a:t>
-            </a:r>
-            <a:r>
-              <a:rPr lang="en-US" altLang="zh-CN" dirty="0"/>
-              <a:t>frequent of consumption high caloric food </a:t>
-            </a:r>
-            <a:r>
-              <a:rPr lang="en-US" altLang="zh-CN" dirty="0" smtClean="0"/>
-              <a:t> and physical </a:t>
-            </a:r>
-            <a:r>
-              <a:rPr lang="en-US" altLang="zh-CN" dirty="0"/>
-              <a:t>activity </a:t>
-            </a:r>
-            <a:r>
-              <a:rPr lang="en-US" altLang="zh-CN" dirty="0" smtClean="0"/>
-              <a:t>frequency.</a:t>
-            </a:r>
-            <a:endParaRPr lang="zh-CN" altLang="en-US" dirty="0"/>
-          </a:p>
-          <a:p>
-            <a:pPr>
-              <a:lnSpc>
-                <a:spcPct val="200000"/>
-              </a:lnSpc>
-            </a:pPr>
-            <a:endParaRPr lang="en-US" altLang="zh-CN" dirty="0" smtClean="0"/>
-          </a:p>
-          <a:p>
-            <a:pPr>
-              <a:lnSpc>
-                <a:spcPct val="200000"/>
-              </a:lnSpc>
-            </a:pPr>
-            <a:r>
-              <a:rPr lang="en-US" altLang="zh-CN" sz="2400" b="1" dirty="0" smtClean="0">
-                <a:latin typeface="Times New Roman" panose="02020603050405020304" pitchFamily="18" charset="0"/>
-                <a:ea typeface="SimSun" panose="02010600030101010101" pitchFamily="2" charset="-122"/>
-                <a:cs typeface="SimSun" panose="02010600030101010101" pitchFamily="2" charset="-122"/>
-              </a:rPr>
-              <a:t>Suggestions:</a:t>
-            </a:r>
-          </a:p>
-          <a:p>
-            <a:pPr>
-              <a:lnSpc>
-                <a:spcPct val="200000"/>
-              </a:lnSpc>
-            </a:pPr>
-            <a:r>
-              <a:rPr lang="en-US" altLang="zh-CN" dirty="0" smtClean="0"/>
-              <a:t>Pay more attention from youth.</a:t>
-            </a:r>
-          </a:p>
-          <a:p>
-            <a:pPr>
-              <a:lnSpc>
-                <a:spcPct val="200000"/>
-              </a:lnSpc>
-            </a:pPr>
-            <a:r>
-              <a:rPr lang="en-US" altLang="zh-CN" dirty="0" smtClean="0"/>
-              <a:t>Reduce of frequency of consumption </a:t>
-            </a:r>
-            <a:r>
-              <a:rPr lang="en-US" altLang="zh-CN" dirty="0"/>
-              <a:t>high caloric </a:t>
-            </a:r>
-            <a:r>
-              <a:rPr lang="en-US" altLang="zh-CN" dirty="0" smtClean="0"/>
-              <a:t>food</a:t>
-            </a:r>
-          </a:p>
-          <a:p>
-            <a:pPr>
-              <a:lnSpc>
-                <a:spcPct val="200000"/>
-              </a:lnSpc>
-            </a:pPr>
-            <a:r>
-              <a:rPr lang="en-US" altLang="zh-CN" dirty="0" smtClean="0"/>
-              <a:t>Take more physical activity.</a:t>
-            </a:r>
-            <a:endParaRPr lang="zh-CN" altLang="en-US" dirty="0"/>
-          </a:p>
-          <a:p>
-            <a:pPr>
-              <a:lnSpc>
-                <a:spcPct val="200000"/>
-              </a:lnSpc>
-            </a:pPr>
-            <a:endParaRPr lang="zh-CN" altLang="zh-CN" dirty="0">
-              <a:latin typeface="SimSun" panose="02010600030101010101" pitchFamily="2" charset="-122"/>
-              <a:ea typeface="SimSun" panose="02010600030101010101" pitchFamily="2" charset="-122"/>
-              <a:cs typeface="SimSun" panose="02010600030101010101" pitchFamily="2" charset="-122"/>
+              <a:rPr lang="en-CA" altLang="zh-CN" sz="1600" dirty="0" smtClean="0">
+                <a:latin typeface="Times New Roman" panose="02020603050405020304" pitchFamily="18" charset="0"/>
+              </a:rPr>
+              <a:t>  United Airline </a:t>
+            </a:r>
+            <a:r>
+              <a:rPr lang="en-CA" altLang="zh-CN" sz="1600" dirty="0">
+                <a:latin typeface="Times New Roman" panose="02020603050405020304" pitchFamily="18" charset="0"/>
+              </a:rPr>
+              <a:t>stands out as the </a:t>
+            </a:r>
+            <a:r>
+              <a:rPr lang="en-CA" altLang="zh-CN" sz="1600" dirty="0" smtClean="0">
+                <a:latin typeface="Times New Roman" panose="02020603050405020304" pitchFamily="18" charset="0"/>
+              </a:rPr>
+              <a:t>airlines </a:t>
+            </a:r>
+            <a:r>
+              <a:rPr lang="en-CA" altLang="zh-CN" sz="1600" dirty="0">
+                <a:latin typeface="Times New Roman" panose="02020603050405020304" pitchFamily="18" charset="0"/>
+              </a:rPr>
+              <a:t>with most damaging bird strikes. </a:t>
+            </a:r>
+            <a:r>
+              <a:rPr lang="en-CA" altLang="zh-CN" sz="1600" dirty="0">
+                <a:solidFill>
+                  <a:srgbClr val="FF0000"/>
+                </a:solidFill>
+                <a:latin typeface="Times New Roman" panose="02020603050405020304" pitchFamily="18" charset="0"/>
+              </a:rPr>
+              <a:t>More information on the </a:t>
+            </a:r>
+            <a:r>
+              <a:rPr lang="en-CA" altLang="zh-CN" sz="1600" dirty="0" smtClean="0">
+                <a:solidFill>
+                  <a:srgbClr val="FF0000"/>
+                </a:solidFill>
+                <a:latin typeface="Times New Roman" panose="02020603050405020304" pitchFamily="18" charset="0"/>
+              </a:rPr>
+              <a:t>airline would </a:t>
+            </a:r>
+            <a:r>
+              <a:rPr lang="en-CA" altLang="zh-CN" sz="1600" dirty="0">
+                <a:solidFill>
+                  <a:srgbClr val="FF0000"/>
+                </a:solidFill>
+                <a:latin typeface="Times New Roman" panose="02020603050405020304" pitchFamily="18" charset="0"/>
+              </a:rPr>
+              <a:t>be needed to understand the cause, e.g. bird migration routes, </a:t>
+            </a:r>
+            <a:r>
+              <a:rPr lang="en-CA" altLang="zh-CN" sz="1600" dirty="0" smtClean="0">
+                <a:solidFill>
+                  <a:srgbClr val="FF0000"/>
+                </a:solidFill>
+                <a:latin typeface="Times New Roman" panose="02020603050405020304" pitchFamily="18" charset="0"/>
+              </a:rPr>
+              <a:t>airline </a:t>
+            </a:r>
+            <a:r>
+              <a:rPr lang="en-CA" altLang="zh-CN" sz="1600" dirty="0">
+                <a:solidFill>
+                  <a:srgbClr val="FF0000"/>
+                </a:solidFill>
+                <a:latin typeface="Times New Roman" panose="02020603050405020304" pitchFamily="18" charset="0"/>
+              </a:rPr>
+              <a:t>traffic, bird control measures etc</a:t>
+            </a:r>
+            <a:r>
+              <a:rPr lang="en-CA" altLang="zh-CN" sz="1600" dirty="0" smtClean="0">
+                <a:solidFill>
+                  <a:srgbClr val="FF0000"/>
+                </a:solidFill>
+                <a:latin typeface="Times New Roman" panose="02020603050405020304" pitchFamily="18" charset="0"/>
+              </a:rPr>
+              <a:t>.</a:t>
+            </a:r>
+            <a:endParaRPr lang="en-CA" altLang="zh-CN" sz="1600" dirty="0">
+              <a:solidFill>
+                <a:srgbClr val="FF0000"/>
+              </a:solidFill>
+              <a:latin typeface="Times New Roman" panose="02020603050405020304" pitchFamily="18" charset="0"/>
             </a:endParaRPr>
           </a:p>
         </p:txBody>

</xml_diff>